<commit_message>
Added user account for data
</commit_message>
<xml_diff>
--- a/00 Doc/International Cancer Data.pptx
+++ b/00 Doc/International Cancer Data.pptx
@@ -13,8 +13,8 @@
     <p:sldId id="281" r:id="rId4"/>
     <p:sldId id="276" r:id="rId5"/>
     <p:sldId id="277" r:id="rId6"/>
-    <p:sldId id="278" r:id="rId7"/>
-    <p:sldId id="279" r:id="rId8"/>
+    <p:sldId id="279" r:id="rId7"/>
+    <p:sldId id="278" r:id="rId8"/>
     <p:sldId id="280" r:id="rId9"/>
     <p:sldId id="259" r:id="rId10"/>
     <p:sldId id="260" r:id="rId11"/>
@@ -1102,7 +1102,7 @@
             <a:extLst/>
           </a:lstStyle>
           <a:p>
-            <a:fld id="{3F5920F0-CFF8-416F-AE1A-6981FA2CBB55}" type="datetimeFigureOut">
+            <a:fld id="{B611ED62-785C-46FA-BD7A-BD6E39D4DA98}" type="datetime1">
               <a:rPr lang="en-US" smtClean="0"/>
               <a:t>5/11/2015</a:t>
             </a:fld>
@@ -1298,7 +1298,7 @@
             <a:extLst/>
           </a:lstStyle>
           <a:p>
-            <a:fld id="{3F5920F0-CFF8-416F-AE1A-6981FA2CBB55}" type="datetimeFigureOut">
+            <a:fld id="{AB62AE87-BB2E-44B8-880B-9D64FD71646D}" type="datetime1">
               <a:rPr lang="en-US" smtClean="0"/>
               <a:t>5/11/2015</a:t>
             </a:fld>
@@ -1483,7 +1483,7 @@
             <a:extLst/>
           </a:lstStyle>
           <a:p>
-            <a:fld id="{3F5920F0-CFF8-416F-AE1A-6981FA2CBB55}" type="datetimeFigureOut">
+            <a:fld id="{A6DA3DEF-D26F-475A-91B0-FDB47EEF81C1}" type="datetime1">
               <a:rPr lang="en-US" smtClean="0"/>
               <a:t>5/11/2015</a:t>
             </a:fld>
@@ -1633,7 +1633,7 @@
             <a:extLst/>
           </a:lstStyle>
           <a:p>
-            <a:fld id="{3F5920F0-CFF8-416F-AE1A-6981FA2CBB55}" type="datetimeFigureOut">
+            <a:fld id="{C30B0B5A-ABAC-4F79-B571-3CEF747B74AA}" type="datetime1">
               <a:rPr lang="en-US" smtClean="0"/>
               <a:t>5/11/2015</a:t>
             </a:fld>
@@ -1888,7 +1888,7 @@
             <a:extLst/>
           </a:lstStyle>
           <a:p>
-            <a:fld id="{3F5920F0-CFF8-416F-AE1A-6981FA2CBB55}" type="datetimeFigureOut">
+            <a:fld id="{AA8B7409-4B7F-4539-BCF7-91BBCEF2A92C}" type="datetime1">
               <a:rPr lang="en-US" smtClean="0"/>
               <a:t>5/11/2015</a:t>
             </a:fld>
@@ -2297,7 +2297,7 @@
             <a:extLst/>
           </a:lstStyle>
           <a:p>
-            <a:fld id="{3F5920F0-CFF8-416F-AE1A-6981FA2CBB55}" type="datetimeFigureOut">
+            <a:fld id="{6B6801A5-783E-4DCD-B70B-752EA616DE3A}" type="datetime1">
               <a:rPr lang="en-US" smtClean="0"/>
               <a:t>5/11/2015</a:t>
             </a:fld>
@@ -2743,7 +2743,7 @@
             <a:extLst/>
           </a:lstStyle>
           <a:p>
-            <a:fld id="{3F5920F0-CFF8-416F-AE1A-6981FA2CBB55}" type="datetimeFigureOut">
+            <a:fld id="{53C77F45-C7B5-4364-9EE9-7E6893E4E2BC}" type="datetime1">
               <a:rPr lang="en-US" smtClean="0"/>
               <a:t>5/11/2015</a:t>
             </a:fld>
@@ -2844,7 +2844,7 @@
             <a:extLst/>
           </a:lstStyle>
           <a:p>
-            <a:fld id="{3F5920F0-CFF8-416F-AE1A-6981FA2CBB55}" type="datetimeFigureOut">
+            <a:fld id="{EC868854-3CB6-4F21-935F-15504E10D54B}" type="datetime1">
               <a:rPr lang="en-US" smtClean="0"/>
               <a:t>5/11/2015</a:t>
             </a:fld>
@@ -2965,7 +2965,7 @@
             <a:extLst/>
           </a:lstStyle>
           <a:p>
-            <a:fld id="{3F5920F0-CFF8-416F-AE1A-6981FA2CBB55}" type="datetimeFigureOut">
+            <a:fld id="{06EA2EE9-ACB5-4952-BA9E-26ED3D54A462}" type="datetime1">
               <a:rPr lang="en-US" smtClean="0"/>
               <a:t>5/11/2015</a:t>
             </a:fld>
@@ -3239,7 +3239,7 @@
             <a:extLst/>
           </a:lstStyle>
           <a:p>
-            <a:fld id="{3F5920F0-CFF8-416F-AE1A-6981FA2CBB55}" type="datetimeFigureOut">
+            <a:fld id="{8EE9BAD8-5C66-47FC-A45C-AD6D6D586152}" type="datetime1">
               <a:rPr lang="en-US" smtClean="0"/>
               <a:t>5/11/2015</a:t>
             </a:fld>
@@ -3444,7 +3444,7 @@
             <a:extLst/>
           </a:lstStyle>
           <a:p>
-            <a:fld id="{3F5920F0-CFF8-416F-AE1A-6981FA2CBB55}" type="datetimeFigureOut">
+            <a:fld id="{E6F26E74-0B84-43E7-824B-C591605BA071}" type="datetime1">
               <a:rPr lang="en-US" smtClean="0"/>
               <a:t>5/11/2015</a:t>
             </a:fld>
@@ -4553,7 +4553,7 @@
             <a:extLst/>
           </a:lstStyle>
           <a:p>
-            <a:fld id="{3F5920F0-CFF8-416F-AE1A-6981FA2CBB55}" type="datetimeFigureOut">
+            <a:fld id="{2FF32D43-D8D8-4888-865F-DACCFE5708F1}" type="datetime1">
               <a:rPr lang="en-US" smtClean="0"/>
               <a:t>5/11/2015</a:t>
             </a:fld>
@@ -4653,6 +4653,7 @@
     <p:sldLayoutId id="2147483670" r:id="rId10"/>
     <p:sldLayoutId id="2147483671" r:id="rId11"/>
   </p:sldLayoutIdLst>
+  <p:hf hdr="0" ftr="0" dt="0"/>
   <p:txStyles>
     <p:titleStyle>
       <a:lvl1pPr algn="l" rtl="0" eaLnBrk="1" latinLnBrk="0" hangingPunct="1">
@@ -5008,6 +5009,29 @@
           </a:p>
         </p:txBody>
       </p:sp>
+      <p:sp>
+        <p:nvSpPr>
+          <p:cNvPr id="4" name="Slide Number Placeholder 3"/>
+          <p:cNvSpPr>
+            <a:spLocks noGrp="1"/>
+          </p:cNvSpPr>
+          <p:nvPr>
+            <p:ph type="sldNum" sz="quarter" idx="12"/>
+          </p:nvPr>
+        </p:nvSpPr>
+        <p:spPr/>
+        <p:txBody>
+          <a:bodyPr/>
+          <a:lstStyle/>
+          <a:p>
+            <a:fld id="{57CCFF2B-B348-457A-B78C-1B44ABC3F6B4}" type="slidenum">
+              <a:rPr lang="en-US" smtClean="0"/>
+              <a:t>1</a:t>
+            </a:fld>
+            <a:endParaRPr lang="en-US"/>
+          </a:p>
+        </p:txBody>
+      </p:sp>
     </p:spTree>
     <p:extLst>
       <p:ext uri="{BB962C8B-B14F-4D97-AF65-F5344CB8AC3E}">
@@ -5137,6 +5161,29 @@
           </a:extLst>
         </p:spPr>
       </p:pic>
+      <p:sp>
+        <p:nvSpPr>
+          <p:cNvPr id="4" name="Slide Number Placeholder 3"/>
+          <p:cNvSpPr>
+            <a:spLocks noGrp="1"/>
+          </p:cNvSpPr>
+          <p:nvPr>
+            <p:ph type="sldNum" sz="quarter" idx="12"/>
+          </p:nvPr>
+        </p:nvSpPr>
+        <p:spPr/>
+        <p:txBody>
+          <a:bodyPr/>
+          <a:lstStyle/>
+          <a:p>
+            <a:fld id="{57CCFF2B-B348-457A-B78C-1B44ABC3F6B4}" type="slidenum">
+              <a:rPr lang="en-US" smtClean="0"/>
+              <a:t>10</a:t>
+            </a:fld>
+            <a:endParaRPr lang="en-US"/>
+          </a:p>
+        </p:txBody>
+      </p:sp>
     </p:spTree>
     <p:extLst>
       <p:ext uri="{BB962C8B-B14F-4D97-AF65-F5344CB8AC3E}">
@@ -5266,6 +5313,29 @@
           </a:extLst>
         </p:spPr>
       </p:pic>
+      <p:sp>
+        <p:nvSpPr>
+          <p:cNvPr id="4" name="Slide Number Placeholder 3"/>
+          <p:cNvSpPr>
+            <a:spLocks noGrp="1"/>
+          </p:cNvSpPr>
+          <p:nvPr>
+            <p:ph type="sldNum" sz="quarter" idx="12"/>
+          </p:nvPr>
+        </p:nvSpPr>
+        <p:spPr/>
+        <p:txBody>
+          <a:bodyPr/>
+          <a:lstStyle/>
+          <a:p>
+            <a:fld id="{57CCFF2B-B348-457A-B78C-1B44ABC3F6B4}" type="slidenum">
+              <a:rPr lang="en-US" smtClean="0"/>
+              <a:t>11</a:t>
+            </a:fld>
+            <a:endParaRPr lang="en-US"/>
+          </a:p>
+        </p:txBody>
+      </p:sp>
     </p:spTree>
     <p:extLst>
       <p:ext uri="{BB962C8B-B14F-4D97-AF65-F5344CB8AC3E}">
@@ -5395,6 +5465,29 @@
           </a:extLst>
         </p:spPr>
       </p:pic>
+      <p:sp>
+        <p:nvSpPr>
+          <p:cNvPr id="4" name="Slide Number Placeholder 3"/>
+          <p:cNvSpPr>
+            <a:spLocks noGrp="1"/>
+          </p:cNvSpPr>
+          <p:nvPr>
+            <p:ph type="sldNum" sz="quarter" idx="12"/>
+          </p:nvPr>
+        </p:nvSpPr>
+        <p:spPr/>
+        <p:txBody>
+          <a:bodyPr/>
+          <a:lstStyle/>
+          <a:p>
+            <a:fld id="{57CCFF2B-B348-457A-B78C-1B44ABC3F6B4}" type="slidenum">
+              <a:rPr lang="en-US" smtClean="0"/>
+              <a:t>12</a:t>
+            </a:fld>
+            <a:endParaRPr lang="en-US"/>
+          </a:p>
+        </p:txBody>
+      </p:sp>
     </p:spTree>
     <p:extLst>
       <p:ext uri="{BB962C8B-B14F-4D97-AF65-F5344CB8AC3E}">
@@ -5524,6 +5617,29 @@
           </a:extLst>
         </p:spPr>
       </p:pic>
+      <p:sp>
+        <p:nvSpPr>
+          <p:cNvPr id="4" name="Slide Number Placeholder 3"/>
+          <p:cNvSpPr>
+            <a:spLocks noGrp="1"/>
+          </p:cNvSpPr>
+          <p:nvPr>
+            <p:ph type="sldNum" sz="quarter" idx="12"/>
+          </p:nvPr>
+        </p:nvSpPr>
+        <p:spPr/>
+        <p:txBody>
+          <a:bodyPr/>
+          <a:lstStyle/>
+          <a:p>
+            <a:fld id="{57CCFF2B-B348-457A-B78C-1B44ABC3F6B4}" type="slidenum">
+              <a:rPr lang="en-US" smtClean="0"/>
+              <a:t>13</a:t>
+            </a:fld>
+            <a:endParaRPr lang="en-US"/>
+          </a:p>
+        </p:txBody>
+      </p:sp>
     </p:spTree>
     <p:extLst>
       <p:ext uri="{BB962C8B-B14F-4D97-AF65-F5344CB8AC3E}">
@@ -5636,6 +5752,29 @@
           </a:extLst>
         </p:spPr>
       </p:pic>
+      <p:sp>
+        <p:nvSpPr>
+          <p:cNvPr id="2" name="Slide Number Placeholder 1"/>
+          <p:cNvSpPr>
+            <a:spLocks noGrp="1"/>
+          </p:cNvSpPr>
+          <p:nvPr>
+            <p:ph type="sldNum" sz="quarter" idx="12"/>
+          </p:nvPr>
+        </p:nvSpPr>
+        <p:spPr/>
+        <p:txBody>
+          <a:bodyPr/>
+          <a:lstStyle/>
+          <a:p>
+            <a:fld id="{57CCFF2B-B348-457A-B78C-1B44ABC3F6B4}" type="slidenum">
+              <a:rPr lang="en-US" smtClean="0"/>
+              <a:t>14</a:t>
+            </a:fld>
+            <a:endParaRPr lang="en-US"/>
+          </a:p>
+        </p:txBody>
+      </p:sp>
     </p:spTree>
     <p:extLst>
       <p:ext uri="{BB962C8B-B14F-4D97-AF65-F5344CB8AC3E}">
@@ -10945,6 +11084,29 @@
           </a:graphicData>
         </a:graphic>
       </p:graphicFrame>
+      <p:sp>
+        <p:nvSpPr>
+          <p:cNvPr id="2" name="Slide Number Placeholder 1"/>
+          <p:cNvSpPr>
+            <a:spLocks noGrp="1"/>
+          </p:cNvSpPr>
+          <p:nvPr>
+            <p:ph type="sldNum" sz="quarter" idx="12"/>
+          </p:nvPr>
+        </p:nvSpPr>
+        <p:spPr/>
+        <p:txBody>
+          <a:bodyPr/>
+          <a:lstStyle/>
+          <a:p>
+            <a:fld id="{57CCFF2B-B348-457A-B78C-1B44ABC3F6B4}" type="slidenum">
+              <a:rPr lang="en-US" smtClean="0"/>
+              <a:t>15</a:t>
+            </a:fld>
+            <a:endParaRPr lang="en-US"/>
+          </a:p>
+        </p:txBody>
+      </p:sp>
     </p:spTree>
     <p:extLst>
       <p:ext uri="{BB962C8B-B14F-4D97-AF65-F5344CB8AC3E}">
@@ -11043,7 +11205,7 @@
         </p:blipFill>
         <p:spPr bwMode="auto">
           <a:xfrm>
-            <a:off x="-1" y="0"/>
+            <a:off x="-8626" y="1181100"/>
             <a:ext cx="9161253" cy="4495800"/>
           </a:xfrm>
           <a:prstGeom prst="rect">
@@ -11074,6 +11236,29 @@
           </a:extLst>
         </p:spPr>
       </p:pic>
+      <p:sp>
+        <p:nvSpPr>
+          <p:cNvPr id="4" name="Slide Number Placeholder 3"/>
+          <p:cNvSpPr>
+            <a:spLocks noGrp="1"/>
+          </p:cNvSpPr>
+          <p:nvPr>
+            <p:ph type="sldNum" sz="quarter" idx="12"/>
+          </p:nvPr>
+        </p:nvSpPr>
+        <p:spPr/>
+        <p:txBody>
+          <a:bodyPr/>
+          <a:lstStyle/>
+          <a:p>
+            <a:fld id="{57CCFF2B-B348-457A-B78C-1B44ABC3F6B4}" type="slidenum">
+              <a:rPr lang="en-US" smtClean="0"/>
+              <a:t>16</a:t>
+            </a:fld>
+            <a:endParaRPr lang="en-US"/>
+          </a:p>
+        </p:txBody>
+      </p:sp>
     </p:spTree>
     <p:extLst>
       <p:ext uri="{BB962C8B-B14F-4D97-AF65-F5344CB8AC3E}">
@@ -11203,6 +11388,29 @@
           </a:extLst>
         </p:spPr>
       </p:pic>
+      <p:sp>
+        <p:nvSpPr>
+          <p:cNvPr id="4" name="Slide Number Placeholder 3"/>
+          <p:cNvSpPr>
+            <a:spLocks noGrp="1"/>
+          </p:cNvSpPr>
+          <p:nvPr>
+            <p:ph type="sldNum" sz="quarter" idx="12"/>
+          </p:nvPr>
+        </p:nvSpPr>
+        <p:spPr/>
+        <p:txBody>
+          <a:bodyPr/>
+          <a:lstStyle/>
+          <a:p>
+            <a:fld id="{57CCFF2B-B348-457A-B78C-1B44ABC3F6B4}" type="slidenum">
+              <a:rPr lang="en-US" smtClean="0"/>
+              <a:t>17</a:t>
+            </a:fld>
+            <a:endParaRPr lang="en-US"/>
+          </a:p>
+        </p:txBody>
+      </p:sp>
     </p:spTree>
     <p:extLst>
       <p:ext uri="{BB962C8B-B14F-4D97-AF65-F5344CB8AC3E}">
@@ -11332,6 +11540,29 @@
           </a:extLst>
         </p:spPr>
       </p:pic>
+      <p:sp>
+        <p:nvSpPr>
+          <p:cNvPr id="4" name="Slide Number Placeholder 3"/>
+          <p:cNvSpPr>
+            <a:spLocks noGrp="1"/>
+          </p:cNvSpPr>
+          <p:nvPr>
+            <p:ph type="sldNum" sz="quarter" idx="12"/>
+          </p:nvPr>
+        </p:nvSpPr>
+        <p:spPr/>
+        <p:txBody>
+          <a:bodyPr/>
+          <a:lstStyle/>
+          <a:p>
+            <a:fld id="{57CCFF2B-B348-457A-B78C-1B44ABC3F6B4}" type="slidenum">
+              <a:rPr lang="en-US" smtClean="0"/>
+              <a:t>18</a:t>
+            </a:fld>
+            <a:endParaRPr lang="en-US"/>
+          </a:p>
+        </p:txBody>
+      </p:sp>
     </p:spTree>
     <p:extLst>
       <p:ext uri="{BB962C8B-B14F-4D97-AF65-F5344CB8AC3E}">
@@ -11461,6 +11692,29 @@
           </a:extLst>
         </p:spPr>
       </p:pic>
+      <p:sp>
+        <p:nvSpPr>
+          <p:cNvPr id="4" name="Slide Number Placeholder 3"/>
+          <p:cNvSpPr>
+            <a:spLocks noGrp="1"/>
+          </p:cNvSpPr>
+          <p:nvPr>
+            <p:ph type="sldNum" sz="quarter" idx="12"/>
+          </p:nvPr>
+        </p:nvSpPr>
+        <p:spPr/>
+        <p:txBody>
+          <a:bodyPr/>
+          <a:lstStyle/>
+          <a:p>
+            <a:fld id="{57CCFF2B-B348-457A-B78C-1B44ABC3F6B4}" type="slidenum">
+              <a:rPr lang="en-US" smtClean="0"/>
+              <a:t>19</a:t>
+            </a:fld>
+            <a:endParaRPr lang="en-US"/>
+          </a:p>
+        </p:txBody>
+      </p:sp>
     </p:spTree>
     <p:extLst>
       <p:ext uri="{BB962C8B-B14F-4D97-AF65-F5344CB8AC3E}">
@@ -11590,6 +11844,107 @@
           </a:extLst>
         </p:spPr>
       </p:pic>
+      <p:sp>
+        <p:nvSpPr>
+          <p:cNvPr id="5" name="Rectangle 4"/>
+          <p:cNvSpPr/>
+          <p:nvPr/>
+        </p:nvSpPr>
+        <p:spPr>
+          <a:xfrm>
+            <a:off x="0" y="1371600"/>
+            <a:ext cx="3276600" cy="457200"/>
+          </a:xfrm>
+          <a:prstGeom prst="rect">
+            <a:avLst/>
+          </a:prstGeom>
+          <a:solidFill>
+            <a:schemeClr val="bg1"/>
+          </a:solidFill>
+          <a:ln>
+            <a:solidFill>
+              <a:schemeClr val="bg1"/>
+            </a:solidFill>
+          </a:ln>
+        </p:spPr>
+        <p:style>
+          <a:lnRef idx="2">
+            <a:schemeClr val="accent1">
+              <a:shade val="50000"/>
+            </a:schemeClr>
+          </a:lnRef>
+          <a:fillRef idx="1">
+            <a:schemeClr val="accent1"/>
+          </a:fillRef>
+          <a:effectRef idx="0">
+            <a:schemeClr val="accent1"/>
+          </a:effectRef>
+          <a:fontRef idx="minor">
+            <a:schemeClr val="lt1"/>
+          </a:fontRef>
+        </p:style>
+        <p:txBody>
+          <a:bodyPr rtlCol="0" anchor="ctr"/>
+          <a:lstStyle/>
+          <a:p>
+            <a:pPr algn="ctr"/>
+            <a:endParaRPr lang="en-US"/>
+          </a:p>
+        </p:txBody>
+      </p:sp>
+      <p:sp>
+        <p:nvSpPr>
+          <p:cNvPr id="6" name="TextBox 5"/>
+          <p:cNvSpPr txBox="1"/>
+          <p:nvPr/>
+        </p:nvSpPr>
+        <p:spPr>
+          <a:xfrm>
+            <a:off x="0" y="1524000"/>
+            <a:ext cx="5562600" cy="369332"/>
+          </a:xfrm>
+          <a:prstGeom prst="rect">
+            <a:avLst/>
+          </a:prstGeom>
+          <a:noFill/>
+        </p:spPr>
+        <p:txBody>
+          <a:bodyPr wrap="square" rtlCol="0">
+            <a:spAutoFit/>
+          </a:bodyPr>
+          <a:lstStyle/>
+          <a:p>
+            <a:r>
+              <a:rPr lang="en-US" dirty="0" smtClean="0"/>
+              <a:t>Life Expectancy by Continent (2013)</a:t>
+            </a:r>
+            <a:endParaRPr lang="en-US" dirty="0"/>
+          </a:p>
+        </p:txBody>
+      </p:sp>
+      <p:sp>
+        <p:nvSpPr>
+          <p:cNvPr id="7" name="Slide Number Placeholder 6"/>
+          <p:cNvSpPr>
+            <a:spLocks noGrp="1"/>
+          </p:cNvSpPr>
+          <p:nvPr>
+            <p:ph type="sldNum" sz="quarter" idx="12"/>
+          </p:nvPr>
+        </p:nvSpPr>
+        <p:spPr/>
+        <p:txBody>
+          <a:bodyPr/>
+          <a:lstStyle/>
+          <a:p>
+            <a:fld id="{57CCFF2B-B348-457A-B78C-1B44ABC3F6B4}" type="slidenum">
+              <a:rPr lang="en-US" smtClean="0"/>
+              <a:t>2</a:t>
+            </a:fld>
+            <a:endParaRPr lang="en-US"/>
+          </a:p>
+        </p:txBody>
+      </p:sp>
     </p:spTree>
     <p:extLst>
       <p:ext uri="{BB962C8B-B14F-4D97-AF65-F5344CB8AC3E}">
@@ -11719,6 +12074,29 @@
           </a:extLst>
         </p:spPr>
       </p:pic>
+      <p:sp>
+        <p:nvSpPr>
+          <p:cNvPr id="4" name="Slide Number Placeholder 3"/>
+          <p:cNvSpPr>
+            <a:spLocks noGrp="1"/>
+          </p:cNvSpPr>
+          <p:nvPr>
+            <p:ph type="sldNum" sz="quarter" idx="12"/>
+          </p:nvPr>
+        </p:nvSpPr>
+        <p:spPr/>
+        <p:txBody>
+          <a:bodyPr/>
+          <a:lstStyle/>
+          <a:p>
+            <a:fld id="{57CCFF2B-B348-457A-B78C-1B44ABC3F6B4}" type="slidenum">
+              <a:rPr lang="en-US" smtClean="0"/>
+              <a:t>20</a:t>
+            </a:fld>
+            <a:endParaRPr lang="en-US"/>
+          </a:p>
+        </p:txBody>
+      </p:sp>
     </p:spTree>
     <p:extLst>
       <p:ext uri="{BB962C8B-B14F-4D97-AF65-F5344CB8AC3E}">
@@ -11848,6 +12226,29 @@
           </a:extLst>
         </p:spPr>
       </p:pic>
+      <p:sp>
+        <p:nvSpPr>
+          <p:cNvPr id="4" name="Slide Number Placeholder 3"/>
+          <p:cNvSpPr>
+            <a:spLocks noGrp="1"/>
+          </p:cNvSpPr>
+          <p:nvPr>
+            <p:ph type="sldNum" sz="quarter" idx="12"/>
+          </p:nvPr>
+        </p:nvSpPr>
+        <p:spPr/>
+        <p:txBody>
+          <a:bodyPr/>
+          <a:lstStyle/>
+          <a:p>
+            <a:fld id="{57CCFF2B-B348-457A-B78C-1B44ABC3F6B4}" type="slidenum">
+              <a:rPr lang="en-US" smtClean="0"/>
+              <a:t>3</a:t>
+            </a:fld>
+            <a:endParaRPr lang="en-US"/>
+          </a:p>
+        </p:txBody>
+      </p:sp>
     </p:spTree>
     <p:extLst>
       <p:ext uri="{BB962C8B-B14F-4D97-AF65-F5344CB8AC3E}">
@@ -11977,6 +12378,29 @@
           </a:extLst>
         </p:spPr>
       </p:pic>
+      <p:sp>
+        <p:nvSpPr>
+          <p:cNvPr id="4" name="Slide Number Placeholder 3"/>
+          <p:cNvSpPr>
+            <a:spLocks noGrp="1"/>
+          </p:cNvSpPr>
+          <p:nvPr>
+            <p:ph type="sldNum" sz="quarter" idx="12"/>
+          </p:nvPr>
+        </p:nvSpPr>
+        <p:spPr/>
+        <p:txBody>
+          <a:bodyPr/>
+          <a:lstStyle/>
+          <a:p>
+            <a:fld id="{57CCFF2B-B348-457A-B78C-1B44ABC3F6B4}" type="slidenum">
+              <a:rPr lang="en-US" smtClean="0"/>
+              <a:t>4</a:t>
+            </a:fld>
+            <a:endParaRPr lang="en-US"/>
+          </a:p>
+        </p:txBody>
+      </p:sp>
     </p:spTree>
     <p:extLst>
       <p:ext uri="{BB962C8B-B14F-4D97-AF65-F5344CB8AC3E}">
@@ -12089,6 +12513,29 @@
           </a:extLst>
         </p:spPr>
       </p:pic>
+      <p:sp>
+        <p:nvSpPr>
+          <p:cNvPr id="2" name="Slide Number Placeholder 1"/>
+          <p:cNvSpPr>
+            <a:spLocks noGrp="1"/>
+          </p:cNvSpPr>
+          <p:nvPr>
+            <p:ph type="sldNum" sz="quarter" idx="12"/>
+          </p:nvPr>
+        </p:nvSpPr>
+        <p:spPr/>
+        <p:txBody>
+          <a:bodyPr/>
+          <a:lstStyle/>
+          <a:p>
+            <a:fld id="{57CCFF2B-B348-457A-B78C-1B44ABC3F6B4}" type="slidenum">
+              <a:rPr lang="en-US" smtClean="0"/>
+              <a:t>5</a:t>
+            </a:fld>
+            <a:endParaRPr lang="en-US"/>
+          </a:p>
+        </p:txBody>
+      </p:sp>
     </p:spTree>
     <p:extLst>
       <p:ext uri="{BB962C8B-B14F-4D97-AF65-F5344CB8AC3E}">
@@ -12110,6 +12557,158 @@
 </file>
 
 <file path=ppt/slides/slide6.xml><?xml version="1.0" encoding="utf-8"?>
+<p:sld xmlns:a="http://schemas.openxmlformats.org/drawingml/2006/main" xmlns:r="http://schemas.openxmlformats.org/officeDocument/2006/relationships" xmlns:p="http://schemas.openxmlformats.org/presentationml/2006/main">
+  <p:cSld>
+    <p:spTree>
+      <p:nvGrpSpPr>
+        <p:cNvPr id="1" name=""/>
+        <p:cNvGrpSpPr/>
+        <p:nvPr/>
+      </p:nvGrpSpPr>
+      <p:grpSpPr>
+        <a:xfrm>
+          <a:off x="0" y="0"/>
+          <a:ext cx="0" cy="0"/>
+          <a:chOff x="0" y="0"/>
+          <a:chExt cx="0" cy="0"/>
+        </a:xfrm>
+      </p:grpSpPr>
+      <p:sp>
+        <p:nvSpPr>
+          <p:cNvPr id="2" name="Content Placeholder 1"/>
+          <p:cNvSpPr>
+            <a:spLocks noGrp="1"/>
+          </p:cNvSpPr>
+          <p:nvPr>
+            <p:ph idx="1"/>
+          </p:nvPr>
+        </p:nvSpPr>
+        <p:spPr/>
+        <p:txBody>
+          <a:bodyPr/>
+          <a:lstStyle/>
+          <a:p>
+            <a:endParaRPr lang="en-US"/>
+          </a:p>
+        </p:txBody>
+      </p:sp>
+      <p:sp>
+        <p:nvSpPr>
+          <p:cNvPr id="3" name="Title 2"/>
+          <p:cNvSpPr>
+            <a:spLocks noGrp="1"/>
+          </p:cNvSpPr>
+          <p:nvPr>
+            <p:ph type="title"/>
+          </p:nvPr>
+        </p:nvSpPr>
+        <p:spPr/>
+        <p:txBody>
+          <a:bodyPr/>
+          <a:lstStyle/>
+          <a:p>
+            <a:endParaRPr lang="en-US"/>
+          </a:p>
+        </p:txBody>
+      </p:sp>
+      <p:pic>
+        <p:nvPicPr>
+          <p:cNvPr id="23554" name="Picture 2"/>
+          <p:cNvPicPr>
+            <a:picLocks noChangeAspect="1" noChangeArrowheads="1"/>
+          </p:cNvPicPr>
+          <p:nvPr/>
+        </p:nvPicPr>
+        <p:blipFill>
+          <a:blip r:embed="rId2">
+            <a:extLst>
+              <a:ext uri="{28A0092B-C50C-407E-A947-70E740481C1C}">
+                <a14:useLocalDpi xmlns:a14="http://schemas.microsoft.com/office/drawing/2010/main" val="0"/>
+              </a:ext>
+            </a:extLst>
+          </a:blip>
+          <a:srcRect/>
+          <a:stretch>
+            <a:fillRect/>
+          </a:stretch>
+        </p:blipFill>
+        <p:spPr bwMode="auto">
+          <a:xfrm>
+            <a:off x="1" y="1469572"/>
+            <a:ext cx="9143999" cy="3918857"/>
+          </a:xfrm>
+          <a:prstGeom prst="rect">
+            <a:avLst/>
+          </a:prstGeom>
+          <a:noFill/>
+          <a:ln>
+            <a:noFill/>
+          </a:ln>
+          <a:extLst>
+            <a:ext uri="{909E8E84-426E-40DD-AFC4-6F175D3DCCD1}">
+              <a14:hiddenFill xmlns:a14="http://schemas.microsoft.com/office/drawing/2010/main">
+                <a:solidFill>
+                  <a:schemeClr val="accent1"/>
+                </a:solidFill>
+              </a14:hiddenFill>
+            </a:ext>
+            <a:ext uri="{91240B29-F687-4F45-9708-019B960494DF}">
+              <a14:hiddenLine xmlns:a14="http://schemas.microsoft.com/office/drawing/2010/main" w="9525">
+                <a:solidFill>
+                  <a:schemeClr val="tx1"/>
+                </a:solidFill>
+                <a:miter lim="800000"/>
+                <a:headEnd/>
+                <a:tailEnd/>
+              </a14:hiddenLine>
+            </a:ext>
+          </a:extLst>
+        </p:spPr>
+      </p:pic>
+      <p:sp>
+        <p:nvSpPr>
+          <p:cNvPr id="4" name="Slide Number Placeholder 3"/>
+          <p:cNvSpPr>
+            <a:spLocks noGrp="1"/>
+          </p:cNvSpPr>
+          <p:nvPr>
+            <p:ph type="sldNum" sz="quarter" idx="12"/>
+          </p:nvPr>
+        </p:nvSpPr>
+        <p:spPr/>
+        <p:txBody>
+          <a:bodyPr/>
+          <a:lstStyle/>
+          <a:p>
+            <a:fld id="{57CCFF2B-B348-457A-B78C-1B44ABC3F6B4}" type="slidenum">
+              <a:rPr lang="en-US" smtClean="0"/>
+              <a:t>6</a:t>
+            </a:fld>
+            <a:endParaRPr lang="en-US"/>
+          </a:p>
+        </p:txBody>
+      </p:sp>
+    </p:spTree>
+    <p:extLst>
+      <p:ext uri="{BB962C8B-B14F-4D97-AF65-F5344CB8AC3E}">
+        <p14:creationId xmlns:p14="http://schemas.microsoft.com/office/powerpoint/2010/main" val="2674179262"/>
+      </p:ext>
+    </p:extLst>
+  </p:cSld>
+  <p:clrMapOvr>
+    <a:masterClrMapping/>
+  </p:clrMapOvr>
+  <p:timing>
+    <p:tnLst>
+      <p:par>
+        <p:cTn id="1" dur="indefinite" restart="never" nodeType="tmRoot"/>
+      </p:par>
+    </p:tnLst>
+  </p:timing>
+</p:sld>
+</file>
+
+<file path=ppt/slides/slide7.xml><?xml version="1.0" encoding="utf-8"?>
 <p:sld xmlns:a="http://schemas.openxmlformats.org/drawingml/2006/main" xmlns:r="http://schemas.openxmlformats.org/officeDocument/2006/relationships" xmlns:p="http://schemas.openxmlformats.org/presentationml/2006/main">
   <p:cSld>
     <p:spTree>
@@ -12218,51 +12817,14 @@
           </a:extLst>
         </p:spPr>
       </p:pic>
-    </p:spTree>
-    <p:extLst>
-      <p:ext uri="{BB962C8B-B14F-4D97-AF65-F5344CB8AC3E}">
-        <p14:creationId xmlns:p14="http://schemas.microsoft.com/office/powerpoint/2010/main" val="2110616104"/>
-      </p:ext>
-    </p:extLst>
-  </p:cSld>
-  <p:clrMapOvr>
-    <a:masterClrMapping/>
-  </p:clrMapOvr>
-  <p:timing>
-    <p:tnLst>
-      <p:par>
-        <p:cTn id="1" dur="indefinite" restart="never" nodeType="tmRoot"/>
-      </p:par>
-    </p:tnLst>
-  </p:timing>
-</p:sld>
-</file>
-
-<file path=ppt/slides/slide7.xml><?xml version="1.0" encoding="utf-8"?>
-<p:sld xmlns:a="http://schemas.openxmlformats.org/drawingml/2006/main" xmlns:r="http://schemas.openxmlformats.org/officeDocument/2006/relationships" xmlns:p="http://schemas.openxmlformats.org/presentationml/2006/main">
-  <p:cSld>
-    <p:spTree>
-      <p:nvGrpSpPr>
-        <p:cNvPr id="1" name=""/>
-        <p:cNvGrpSpPr/>
-        <p:nvPr/>
-      </p:nvGrpSpPr>
-      <p:grpSpPr>
-        <a:xfrm>
-          <a:off x="0" y="0"/>
-          <a:ext cx="0" cy="0"/>
-          <a:chOff x="0" y="0"/>
-          <a:chExt cx="0" cy="0"/>
-        </a:xfrm>
-      </p:grpSpPr>
       <p:sp>
         <p:nvSpPr>
-          <p:cNvPr id="2" name="Content Placeholder 1"/>
+          <p:cNvPr id="4" name="Slide Number Placeholder 3"/>
           <p:cNvSpPr>
             <a:spLocks noGrp="1"/>
           </p:cNvSpPr>
           <p:nvPr>
-            <p:ph idx="1"/>
+            <p:ph type="sldNum" sz="quarter" idx="12"/>
           </p:nvPr>
         </p:nvSpPr>
         <p:spPr/>
@@ -12270,87 +12832,18 @@
           <a:bodyPr/>
           <a:lstStyle/>
           <a:p>
+            <a:fld id="{57CCFF2B-B348-457A-B78C-1B44ABC3F6B4}" type="slidenum">
+              <a:rPr lang="en-US" smtClean="0"/>
+              <a:t>7</a:t>
+            </a:fld>
             <a:endParaRPr lang="en-US"/>
           </a:p>
         </p:txBody>
       </p:sp>
-      <p:sp>
-        <p:nvSpPr>
-          <p:cNvPr id="3" name="Title 2"/>
-          <p:cNvSpPr>
-            <a:spLocks noGrp="1"/>
-          </p:cNvSpPr>
-          <p:nvPr>
-            <p:ph type="title"/>
-          </p:nvPr>
-        </p:nvSpPr>
-        <p:spPr/>
-        <p:txBody>
-          <a:bodyPr/>
-          <a:lstStyle/>
-          <a:p>
-            <a:endParaRPr lang="en-US"/>
-          </a:p>
-        </p:txBody>
-      </p:sp>
-      <p:pic>
-        <p:nvPicPr>
-          <p:cNvPr id="23554" name="Picture 2"/>
-          <p:cNvPicPr>
-            <a:picLocks noChangeAspect="1" noChangeArrowheads="1"/>
-          </p:cNvPicPr>
-          <p:nvPr/>
-        </p:nvPicPr>
-        <p:blipFill>
-          <a:blip r:embed="rId2">
-            <a:extLst>
-              <a:ext uri="{28A0092B-C50C-407E-A947-70E740481C1C}">
-                <a14:useLocalDpi xmlns:a14="http://schemas.microsoft.com/office/drawing/2010/main" val="0"/>
-              </a:ext>
-            </a:extLst>
-          </a:blip>
-          <a:srcRect/>
-          <a:stretch>
-            <a:fillRect/>
-          </a:stretch>
-        </p:blipFill>
-        <p:spPr bwMode="auto">
-          <a:xfrm>
-            <a:off x="1" y="1469572"/>
-            <a:ext cx="9143999" cy="3918857"/>
-          </a:xfrm>
-          <a:prstGeom prst="rect">
-            <a:avLst/>
-          </a:prstGeom>
-          <a:noFill/>
-          <a:ln>
-            <a:noFill/>
-          </a:ln>
-          <a:extLst>
-            <a:ext uri="{909E8E84-426E-40DD-AFC4-6F175D3DCCD1}">
-              <a14:hiddenFill xmlns:a14="http://schemas.microsoft.com/office/drawing/2010/main">
-                <a:solidFill>
-                  <a:schemeClr val="accent1"/>
-                </a:solidFill>
-              </a14:hiddenFill>
-            </a:ext>
-            <a:ext uri="{91240B29-F687-4F45-9708-019B960494DF}">
-              <a14:hiddenLine xmlns:a14="http://schemas.microsoft.com/office/drawing/2010/main" w="9525">
-                <a:solidFill>
-                  <a:schemeClr val="tx1"/>
-                </a:solidFill>
-                <a:miter lim="800000"/>
-                <a:headEnd/>
-                <a:tailEnd/>
-              </a14:hiddenLine>
-            </a:ext>
-          </a:extLst>
-        </p:spPr>
-      </p:pic>
     </p:spTree>
     <p:extLst>
       <p:ext uri="{BB962C8B-B14F-4D97-AF65-F5344CB8AC3E}">
-        <p14:creationId xmlns:p14="http://schemas.microsoft.com/office/powerpoint/2010/main" val="2674179262"/>
+        <p14:creationId xmlns:p14="http://schemas.microsoft.com/office/powerpoint/2010/main" val="2110616104"/>
       </p:ext>
     </p:extLst>
   </p:cSld>
@@ -14324,6 +14817,29 @@
           </a:p>
         </p:txBody>
       </p:sp>
+      <p:sp>
+        <p:nvSpPr>
+          <p:cNvPr id="2" name="Slide Number Placeholder 1"/>
+          <p:cNvSpPr>
+            <a:spLocks noGrp="1"/>
+          </p:cNvSpPr>
+          <p:nvPr>
+            <p:ph type="sldNum" sz="quarter" idx="12"/>
+          </p:nvPr>
+        </p:nvSpPr>
+        <p:spPr/>
+        <p:txBody>
+          <a:bodyPr/>
+          <a:lstStyle/>
+          <a:p>
+            <a:fld id="{57CCFF2B-B348-457A-B78C-1B44ABC3F6B4}" type="slidenum">
+              <a:rPr lang="en-US" smtClean="0"/>
+              <a:t>8</a:t>
+            </a:fld>
+            <a:endParaRPr lang="en-US"/>
+          </a:p>
+        </p:txBody>
+      </p:sp>
     </p:spTree>
     <p:extLst>
       <p:ext uri="{BB962C8B-B14F-4D97-AF65-F5344CB8AC3E}">
@@ -14453,6 +14969,29 @@
           </a:extLst>
         </p:spPr>
       </p:pic>
+      <p:sp>
+        <p:nvSpPr>
+          <p:cNvPr id="4" name="Slide Number Placeholder 3"/>
+          <p:cNvSpPr>
+            <a:spLocks noGrp="1"/>
+          </p:cNvSpPr>
+          <p:nvPr>
+            <p:ph type="sldNum" sz="quarter" idx="12"/>
+          </p:nvPr>
+        </p:nvSpPr>
+        <p:spPr/>
+        <p:txBody>
+          <a:bodyPr/>
+          <a:lstStyle/>
+          <a:p>
+            <a:fld id="{57CCFF2B-B348-457A-B78C-1B44ABC3F6B4}" type="slidenum">
+              <a:rPr lang="en-US" smtClean="0"/>
+              <a:t>9</a:t>
+            </a:fld>
+            <a:endParaRPr lang="en-US"/>
+          </a:p>
+        </p:txBody>
+      </p:sp>
     </p:spTree>
     <p:extLst>
       <p:ext uri="{BB962C8B-B14F-4D97-AF65-F5344CB8AC3E}">

</xml_diff>